<commit_message>
anjianfeng's pptx about git
</commit_message>
<xml_diff>
--- a/doc/ppt/anjianfeng.pptx
+++ b/doc/ppt/anjianfeng.pptx
@@ -4277,10 +4277,6 @@
               <a:rPr lang="zh-CN" altLang="en-US" sz="1600" dirty="0" smtClean="0"/>
               <a:t>。</a:t>
             </a:r>
-            <a:r>
-              <a:rPr lang="zh-CN" altLang="en-US" sz="1600" dirty="0" smtClean="0"/>
-              <a:t/>
-            </a:r>
             <a:br>
               <a:rPr lang="zh-CN" altLang="en-US" sz="1600" dirty="0" smtClean="0"/>
             </a:br>
@@ -5443,7 +5439,6 @@
               <a:rPr lang="zh-CN" altLang="en-US" sz="1600" dirty="0" smtClean="0"/>
               <a:t>再之前的版本就不看了。</a:t>
             </a:r>
-            <a:endParaRPr lang="zh-CN" altLang="en-US" sz="1600" dirty="0" smtClean="0"/>
           </a:p>
           <a:p>
             <a:pPr algn="l"/>
@@ -5719,7 +5714,6 @@
               <a:rPr lang="zh-CN" altLang="en-US" sz="1600" dirty="0"/>
               <a:t>可见，第二次修改确实没有被提交。</a:t>
             </a:r>
-            <a:endParaRPr lang="zh-CN" altLang="en-US" sz="1600" dirty="0"/>
           </a:p>
         </p:txBody>
       </p:sp>
@@ -5967,12 +5961,19 @@
             <a:pPr algn="l"/>
             <a:r>
               <a:rPr lang="zh-CN" altLang="en-US" sz="1600" dirty="0" smtClean="0"/>
-              <a:t>可以看出，现在</a:t>
-            </a:r>
-            <a:r>
-              <a:rPr lang="zh-CN" altLang="en-US" sz="1600" smtClean="0"/>
-              <a:t>已经提交成功了。</a:t>
-            </a:r>
+              <a:t>可以看出，现在已经提交成功了</a:t>
+            </a:r>
+            <a:r>
+              <a:rPr lang="zh-CN" altLang="en-US" sz="1600" dirty="0" smtClean="0"/>
+              <a:t>。</a:t>
+            </a:r>
+          </a:p>
+          <a:p>
+            <a:pPr algn="l"/>
+            <a:endParaRPr lang="zh-CN" altLang="en-US" sz="1600"/>
+          </a:p>
+          <a:p>
+            <a:pPr algn="l"/>
             <a:endParaRPr lang="zh-CN" altLang="en-US" sz="1600" dirty="0" smtClean="0"/>
           </a:p>
           <a:p>
@@ -7165,11 +7166,7 @@
             </a:r>
             <a:r>
               <a:rPr lang="zh-CN" altLang="en-US" sz="1600" dirty="0" smtClean="0"/>
-              <a:t>，</a:t>
-            </a:r>
-            <a:r>
-              <a:rPr lang="zh-CN" altLang="en-US" sz="1600" dirty="0" smtClean="0"/>
-              <a:t>然后</a:t>
+              <a:t>，然后</a:t>
             </a:r>
             <a:r>
               <a:rPr lang="zh-CN" altLang="en-US" sz="1600" dirty="0"/>
@@ -7495,7 +7492,6 @@
               <a:rPr lang="zh-CN" altLang="en-US" sz="1600" dirty="0"/>
               <a:t>现在，你又可以乘坐时光机回到未来了。</a:t>
             </a:r>
-            <a:endParaRPr lang="zh-CN" altLang="en-US" sz="1600" dirty="0"/>
           </a:p>
           <a:p>
             <a:pPr algn="l"/>

</xml_diff>